<commit_message>
Moved notes to the footer
</commit_message>
<xml_diff>
--- a/max-labs.pptx
+++ b/max-labs.pptx
@@ -221,7 +221,7 @@
           <a:p>
             <a:fld id="{1CF9B939-B623-E445-92B9-3DB0777E2225}" type="datetimeFigureOut">
               <a:rPr lang="en-US" smtClean="0"/>
-              <a:t>10/24/19</a:t>
+              <a:t>10/30/19</a:t>
             </a:fld>
             <a:endParaRPr lang="en-US" dirty="0"/>
           </a:p>
@@ -2735,61 +2735,7 @@
           <a:p>
             <a:fld id="{5C2624FC-1444-B647-AD6C-82E24AD25842}" type="datetimeFigureOut">
               <a:rPr lang="en-US" smtClean="0"/>
-              <a:t>10/24/19</a:t>
-            </a:fld>
-            <a:endParaRPr lang="en-US" dirty="0"/>
-          </a:p>
-        </p:txBody>
-      </p:sp>
-      <p:sp>
-        <p:nvSpPr>
-          <p:cNvPr id="5" name="Footer Placeholder 4">
-            <a:extLst>
-              <a:ext uri="{FF2B5EF4-FFF2-40B4-BE49-F238E27FC236}">
-                <a16:creationId xmlns:a16="http://schemas.microsoft.com/office/drawing/2014/main" id="{213C09AA-3E34-1A4E-94F7-13DC5F532A64}"/>
-              </a:ext>
-            </a:extLst>
-          </p:cNvPr>
-          <p:cNvSpPr>
-            <a:spLocks noGrp="1"/>
-          </p:cNvSpPr>
-          <p:nvPr>
-            <p:ph type="ftr" sz="quarter" idx="11"/>
-          </p:nvPr>
-        </p:nvSpPr>
-        <p:spPr/>
-        <p:txBody>
-          <a:bodyPr/>
-          <a:lstStyle/>
-          <a:p>
-            <a:endParaRPr lang="en-US" dirty="0"/>
-          </a:p>
-        </p:txBody>
-      </p:sp>
-      <p:sp>
-        <p:nvSpPr>
-          <p:cNvPr id="6" name="Slide Number Placeholder 5">
-            <a:extLst>
-              <a:ext uri="{FF2B5EF4-FFF2-40B4-BE49-F238E27FC236}">
-                <a16:creationId xmlns:a16="http://schemas.microsoft.com/office/drawing/2014/main" id="{38F875F1-AD6C-1E43-BCAC-27CF78C2CE7E}"/>
-              </a:ext>
-            </a:extLst>
-          </p:cNvPr>
-          <p:cNvSpPr>
-            <a:spLocks noGrp="1"/>
-          </p:cNvSpPr>
-          <p:nvPr>
-            <p:ph type="sldNum" sz="quarter" idx="12"/>
-          </p:nvPr>
-        </p:nvSpPr>
-        <p:spPr/>
-        <p:txBody>
-          <a:bodyPr/>
-          <a:lstStyle/>
-          <a:p>
-            <a:fld id="{89C6240F-7363-D146-818B-E3C62E4942BC}" type="slidenum">
-              <a:rPr lang="en-US" smtClean="0"/>
-              <a:t>‹#›</a:t>
+              <a:t>10/30/19</a:t>
             </a:fld>
             <a:endParaRPr lang="en-US" dirty="0"/>
           </a:p>
@@ -2933,7 +2879,7 @@
           <a:p>
             <a:fld id="{5C2624FC-1444-B647-AD6C-82E24AD25842}" type="datetimeFigureOut">
               <a:rPr lang="en-US" smtClean="0"/>
-              <a:t>10/24/19</a:t>
+              <a:t>10/30/19</a:t>
             </a:fld>
             <a:endParaRPr lang="en-US" dirty="0"/>
           </a:p>
@@ -3141,7 +3087,7 @@
           <a:p>
             <a:fld id="{5C2624FC-1444-B647-AD6C-82E24AD25842}" type="datetimeFigureOut">
               <a:rPr lang="en-US" smtClean="0"/>
-              <a:t>10/24/19</a:t>
+              <a:t>10/30/19</a:t>
             </a:fld>
             <a:endParaRPr lang="en-US" dirty="0"/>
           </a:p>
@@ -3339,7 +3285,7 @@
           <a:p>
             <a:fld id="{5C2624FC-1444-B647-AD6C-82E24AD25842}" type="datetimeFigureOut">
               <a:rPr lang="en-US" smtClean="0"/>
-              <a:t>10/24/19</a:t>
+              <a:t>10/30/19</a:t>
             </a:fld>
             <a:endParaRPr lang="en-US" dirty="0"/>
           </a:p>
@@ -3614,7 +3560,7 @@
           <a:p>
             <a:fld id="{5C2624FC-1444-B647-AD6C-82E24AD25842}" type="datetimeFigureOut">
               <a:rPr lang="en-US" smtClean="0"/>
-              <a:t>10/24/19</a:t>
+              <a:t>10/30/19</a:t>
             </a:fld>
             <a:endParaRPr lang="en-US" dirty="0"/>
           </a:p>
@@ -3879,7 +3825,7 @@
           <a:p>
             <a:fld id="{5C2624FC-1444-B647-AD6C-82E24AD25842}" type="datetimeFigureOut">
               <a:rPr lang="en-US" smtClean="0"/>
-              <a:t>10/24/19</a:t>
+              <a:t>10/30/19</a:t>
             </a:fld>
             <a:endParaRPr lang="en-US" dirty="0"/>
           </a:p>
@@ -4291,7 +4237,7 @@
           <a:p>
             <a:fld id="{5C2624FC-1444-B647-AD6C-82E24AD25842}" type="datetimeFigureOut">
               <a:rPr lang="en-US" smtClean="0"/>
-              <a:t>10/24/19</a:t>
+              <a:t>10/30/19</a:t>
             </a:fld>
             <a:endParaRPr lang="en-US" dirty="0"/>
           </a:p>
@@ -4432,7 +4378,7 @@
           <a:p>
             <a:fld id="{5C2624FC-1444-B647-AD6C-82E24AD25842}" type="datetimeFigureOut">
               <a:rPr lang="en-US" smtClean="0"/>
-              <a:t>10/24/19</a:t>
+              <a:t>10/30/19</a:t>
             </a:fld>
             <a:endParaRPr lang="en-US" dirty="0"/>
           </a:p>
@@ -4545,7 +4491,7 @@
           <a:p>
             <a:fld id="{5C2624FC-1444-B647-AD6C-82E24AD25842}" type="datetimeFigureOut">
               <a:rPr lang="en-US" smtClean="0"/>
-              <a:t>10/24/19</a:t>
+              <a:t>10/30/19</a:t>
             </a:fld>
             <a:endParaRPr lang="en-US" dirty="0"/>
           </a:p>
@@ -4856,7 +4802,7 @@
           <a:p>
             <a:fld id="{5C2624FC-1444-B647-AD6C-82E24AD25842}" type="datetimeFigureOut">
               <a:rPr lang="en-US" smtClean="0"/>
-              <a:t>10/24/19</a:t>
+              <a:t>10/30/19</a:t>
             </a:fld>
             <a:endParaRPr lang="en-US" dirty="0"/>
           </a:p>
@@ -5144,7 +5090,7 @@
           <a:p>
             <a:fld id="{5C2624FC-1444-B647-AD6C-82E24AD25842}" type="datetimeFigureOut">
               <a:rPr lang="en-US" smtClean="0"/>
-              <a:t>10/24/19</a:t>
+              <a:t>10/30/19</a:t>
             </a:fld>
             <a:endParaRPr lang="en-US" dirty="0"/>
           </a:p>
@@ -5310,35 +5256,35 @@
           <a:p>
             <a:pPr lvl="0"/>
             <a:r>
-              <a:rPr lang="en-US"/>
+              <a:rPr lang="en-US" dirty="0"/>
               <a:t>Edit Master text styles</a:t>
             </a:r>
           </a:p>
           <a:p>
             <a:pPr lvl="1"/>
             <a:r>
-              <a:rPr lang="en-US"/>
+              <a:rPr lang="en-US" dirty="0"/>
               <a:t>Second level</a:t>
             </a:r>
           </a:p>
           <a:p>
             <a:pPr lvl="2"/>
             <a:r>
-              <a:rPr lang="en-US"/>
+              <a:rPr lang="en-US" dirty="0"/>
               <a:t>Third level</a:t>
             </a:r>
           </a:p>
           <a:p>
             <a:pPr lvl="3"/>
             <a:r>
-              <a:rPr lang="en-US"/>
+              <a:rPr lang="en-US" dirty="0"/>
               <a:t>Fourth level</a:t>
             </a:r>
           </a:p>
           <a:p>
             <a:pPr lvl="4"/>
             <a:r>
-              <a:rPr lang="en-US"/>
+              <a:rPr lang="en-US" dirty="0"/>
               <a:t>Fifth level</a:t>
             </a:r>
           </a:p>
@@ -5385,7 +5331,7 @@
           <a:p>
             <a:fld id="{5C2624FC-1444-B647-AD6C-82E24AD25842}" type="datetimeFigureOut">
               <a:rPr lang="en-US" smtClean="0"/>
-              <a:t>10/28/19</a:t>
+              <a:t>10/30/19</a:t>
             </a:fld>
             <a:endParaRPr lang="en-US" dirty="0"/>
           </a:p>
@@ -5495,8 +5441,8 @@
         </p:nvSpPr>
         <p:spPr>
           <a:xfrm>
-            <a:off x="104553" y="32440"/>
-            <a:ext cx="3680637" cy="276999"/>
+            <a:off x="19878" y="6348805"/>
+            <a:ext cx="5895754" cy="461665"/>
           </a:xfrm>
           <a:prstGeom prst="rect">
             <a:avLst/>
@@ -5527,7 +5473,7 @@
               <a:defRPr/>
             </a:pPr>
             <a:r>
-              <a:rPr lang="en-US" sz="1200" dirty="0">
+              <a:rPr lang="en-US" sz="2400" baseline="0" dirty="0">
                 <a:solidFill>
                   <a:schemeClr val="tx1"/>
                 </a:solidFill>
@@ -5535,7 +5481,7 @@
               <a:t>Follow along: </a:t>
             </a:r>
             <a:r>
-              <a:rPr lang="en-US" sz="1200" dirty="0">
+              <a:rPr lang="en-US" sz="2400" baseline="0" dirty="0">
                 <a:solidFill>
                   <a:schemeClr val="tx1"/>
                 </a:solidFill>
@@ -5543,7 +5489,7 @@
               </a:rPr>
               <a:t>https://adobe.ly/xdapi</a:t>
             </a:r>
-            <a:endParaRPr lang="en-US" sz="1200" dirty="0">
+            <a:endParaRPr lang="en-US" sz="2400" baseline="0" dirty="0">
               <a:solidFill>
                 <a:schemeClr val="tx1"/>
               </a:solidFill>
@@ -5565,8 +5511,8 @@
         </p:nvSpPr>
         <p:spPr>
           <a:xfrm>
-            <a:off x="6025117" y="16763"/>
-            <a:ext cx="6166883" cy="276999"/>
+            <a:off x="4560481" y="6381977"/>
+            <a:ext cx="7643038" cy="430887"/>
           </a:xfrm>
           <a:prstGeom prst="rect">
             <a:avLst/>
@@ -5597,15 +5543,15 @@
               <a:defRPr/>
             </a:pPr>
             <a:r>
-              <a:rPr lang="en-US" sz="1200" dirty="0">
+              <a:rPr lang="en-US" sz="2200" baseline="0" dirty="0">
                 <a:solidFill>
                   <a:schemeClr val="tx1"/>
                 </a:solidFill>
               </a:rPr>
-              <a:t>XD API Labs at 11am &amp; 4pm RSVP: </a:t>
-            </a:r>
-            <a:r>
-              <a:rPr lang="en-US" sz="1200" dirty="0">
+              <a:t>RSVP: </a:t>
+            </a:r>
+            <a:r>
+              <a:rPr lang="en-US" sz="2200" baseline="0" dirty="0">
                 <a:solidFill>
                   <a:schemeClr val="tx1"/>
                 </a:solidFill>
@@ -5613,7 +5559,7 @@
               </a:rPr>
               <a:t>https://adobe.ly/xdlabs</a:t>
             </a:r>
-            <a:endParaRPr lang="en-US" sz="1200" dirty="0">
+            <a:endParaRPr lang="en-US" sz="2200" baseline="0" dirty="0">
               <a:solidFill>
                 <a:schemeClr val="tx1"/>
               </a:solidFill>

</xml_diff>